<commit_message>
[monitoring_hard_drop] Update figure colors to be consistent.
</commit_message>
<xml_diff>
--- a/monitoring_hard_drop/figs_src/diagrams-wide.pptx
+++ b/monitoring_hard_drop/figs_src/diagrams-wide.pptx
@@ -293,7 +293,7 @@
           <a:p>
             <a:fld id="{D9DE92D4-3454-4E80-9822-1258D18FA6E8}" type="datetimeFigureOut">
               <a:rPr lang="en-US" smtClean="0"/>
-              <a:t>2/21/2015</a:t>
+              <a:t>2/28/2015</a:t>
             </a:fld>
             <a:endParaRPr lang="en-US"/>
           </a:p>
@@ -463,7 +463,7 @@
           <a:p>
             <a:fld id="{D9DE92D4-3454-4E80-9822-1258D18FA6E8}" type="datetimeFigureOut">
               <a:rPr lang="en-US" smtClean="0"/>
-              <a:t>2/21/2015</a:t>
+              <a:t>2/28/2015</a:t>
             </a:fld>
             <a:endParaRPr lang="en-US"/>
           </a:p>
@@ -643,7 +643,7 @@
           <a:p>
             <a:fld id="{D9DE92D4-3454-4E80-9822-1258D18FA6E8}" type="datetimeFigureOut">
               <a:rPr lang="en-US" smtClean="0"/>
-              <a:t>2/21/2015</a:t>
+              <a:t>2/28/2015</a:t>
             </a:fld>
             <a:endParaRPr lang="en-US"/>
           </a:p>
@@ -813,7 +813,7 @@
           <a:p>
             <a:fld id="{D9DE92D4-3454-4E80-9822-1258D18FA6E8}" type="datetimeFigureOut">
               <a:rPr lang="en-US" smtClean="0"/>
-              <a:t>2/21/2015</a:t>
+              <a:t>2/28/2015</a:t>
             </a:fld>
             <a:endParaRPr lang="en-US"/>
           </a:p>
@@ -1059,7 +1059,7 @@
           <a:p>
             <a:fld id="{D9DE92D4-3454-4E80-9822-1258D18FA6E8}" type="datetimeFigureOut">
               <a:rPr lang="en-US" smtClean="0"/>
-              <a:t>2/21/2015</a:t>
+              <a:t>2/28/2015</a:t>
             </a:fld>
             <a:endParaRPr lang="en-US"/>
           </a:p>
@@ -1347,7 +1347,7 @@
           <a:p>
             <a:fld id="{D9DE92D4-3454-4E80-9822-1258D18FA6E8}" type="datetimeFigureOut">
               <a:rPr lang="en-US" smtClean="0"/>
-              <a:t>2/21/2015</a:t>
+              <a:t>2/28/2015</a:t>
             </a:fld>
             <a:endParaRPr lang="en-US"/>
           </a:p>
@@ -1774,7 +1774,7 @@
           <a:p>
             <a:fld id="{D9DE92D4-3454-4E80-9822-1258D18FA6E8}" type="datetimeFigureOut">
               <a:rPr lang="en-US" smtClean="0"/>
-              <a:t>2/21/2015</a:t>
+              <a:t>2/28/2015</a:t>
             </a:fld>
             <a:endParaRPr lang="en-US"/>
           </a:p>
@@ -1892,7 +1892,7 @@
           <a:p>
             <a:fld id="{D9DE92D4-3454-4E80-9822-1258D18FA6E8}" type="datetimeFigureOut">
               <a:rPr lang="en-US" smtClean="0"/>
-              <a:t>2/21/2015</a:t>
+              <a:t>2/28/2015</a:t>
             </a:fld>
             <a:endParaRPr lang="en-US"/>
           </a:p>
@@ -1987,7 +1987,7 @@
           <a:p>
             <a:fld id="{D9DE92D4-3454-4E80-9822-1258D18FA6E8}" type="datetimeFigureOut">
               <a:rPr lang="en-US" smtClean="0"/>
-              <a:t>2/21/2015</a:t>
+              <a:t>2/28/2015</a:t>
             </a:fld>
             <a:endParaRPr lang="en-US"/>
           </a:p>
@@ -2264,7 +2264,7 @@
           <a:p>
             <a:fld id="{D9DE92D4-3454-4E80-9822-1258D18FA6E8}" type="datetimeFigureOut">
               <a:rPr lang="en-US" smtClean="0"/>
-              <a:t>2/21/2015</a:t>
+              <a:t>2/28/2015</a:t>
             </a:fld>
             <a:endParaRPr lang="en-US"/>
           </a:p>
@@ -2517,7 +2517,7 @@
           <a:p>
             <a:fld id="{D9DE92D4-3454-4E80-9822-1258D18FA6E8}" type="datetimeFigureOut">
               <a:rPr lang="en-US" smtClean="0"/>
-              <a:t>2/21/2015</a:t>
+              <a:t>2/28/2015</a:t>
             </a:fld>
             <a:endParaRPr lang="en-US"/>
           </a:p>
@@ -2730,7 +2730,7 @@
           <a:p>
             <a:fld id="{D9DE92D4-3454-4E80-9822-1258D18FA6E8}" type="datetimeFigureOut">
               <a:rPr lang="en-US" smtClean="0"/>
-              <a:t>2/21/2015</a:t>
+              <a:t>2/28/2015</a:t>
             </a:fld>
             <a:endParaRPr lang="en-US"/>
           </a:p>
@@ -3318,7 +3318,7 @@
         <p:spPr>
           <a:xfrm>
             <a:off x="1289470" y="195842"/>
-            <a:ext cx="0" cy="883447"/>
+            <a:ext cx="0" cy="874790"/>
           </a:xfrm>
           <a:prstGeom prst="straightConnector1">
             <a:avLst/>
@@ -3909,7 +3909,7 @@
             <a:avLst/>
           </a:prstGeom>
           <a:solidFill>
-            <a:srgbClr val="66CCFF"/>
+            <a:srgbClr val="A6CEE3"/>
           </a:solidFill>
           <a:ln w="12700">
             <a:solidFill>
@@ -4126,7 +4126,7 @@
             <a:avLst/>
           </a:prstGeom>
           <a:solidFill>
-            <a:srgbClr val="66CCFF"/>
+            <a:srgbClr val="A6CEE3"/>
           </a:solidFill>
           <a:ln w="12700">
             <a:solidFill>
@@ -4213,7 +4213,7 @@
             <a:avLst/>
           </a:prstGeom>
           <a:solidFill>
-            <a:srgbClr val="66CCFF"/>
+            <a:srgbClr val="A6CEE3"/>
           </a:solidFill>
           <a:ln w="12700">
             <a:solidFill>
@@ -4263,9 +4263,14 @@
           <a:prstGeom prst="rightArrow">
             <a:avLst/>
           </a:prstGeom>
-          <a:solidFill>
-            <a:srgbClr val="C00000"/>
-          </a:solidFill>
+          <a:pattFill prst="ltUpDiag">
+            <a:fgClr>
+              <a:schemeClr val="tx1"/>
+            </a:fgClr>
+            <a:bgClr>
+              <a:srgbClr val="FB9A99"/>
+            </a:bgClr>
+          </a:pattFill>
           <a:ln w="12700">
             <a:solidFill>
               <a:schemeClr val="tx1"/>
@@ -5507,7 +5512,7 @@
             <a:avLst/>
           </a:prstGeom>
           <a:solidFill>
-            <a:srgbClr val="66CCFF"/>
+            <a:srgbClr val="A6CEE3"/>
           </a:solidFill>
           <a:ln w="12700">
             <a:solidFill>
@@ -5571,7 +5576,7 @@
             <a:avLst/>
           </a:prstGeom>
           <a:solidFill>
-            <a:srgbClr val="66CCFF"/>
+            <a:srgbClr val="A6CEE3"/>
           </a:solidFill>
           <a:ln w="12700">
             <a:solidFill>
@@ -10748,7 +10753,7 @@
             <a:avLst/>
           </a:prstGeom>
           <a:solidFill>
-            <a:srgbClr val="66CCFF"/>
+            <a:srgbClr val="A6CEE3"/>
           </a:solidFill>
           <a:ln w="12700">
             <a:solidFill>
@@ -10812,7 +10817,7 @@
             <a:avLst/>
           </a:prstGeom>
           <a:solidFill>
-            <a:srgbClr val="66CCFF"/>
+            <a:srgbClr val="A6CEE3"/>
           </a:solidFill>
           <a:ln w="12700">
             <a:solidFill>

</xml_diff>

<commit_message>
[monitoring_hard_drop] Various minor edits.
</commit_message>
<xml_diff>
--- a/monitoring_hard_drop/figs_src/diagrams-wide.pptx
+++ b/monitoring_hard_drop/figs_src/diagrams-wide.pptx
@@ -293,7 +293,7 @@
           <a:p>
             <a:fld id="{D9DE92D4-3454-4E80-9822-1258D18FA6E8}" type="datetimeFigureOut">
               <a:rPr lang="en-US" smtClean="0"/>
-              <a:t>2/28/2015</a:t>
+              <a:t>3/6/2015</a:t>
             </a:fld>
             <a:endParaRPr lang="en-US"/>
           </a:p>
@@ -463,7 +463,7 @@
           <a:p>
             <a:fld id="{D9DE92D4-3454-4E80-9822-1258D18FA6E8}" type="datetimeFigureOut">
               <a:rPr lang="en-US" smtClean="0"/>
-              <a:t>2/28/2015</a:t>
+              <a:t>3/6/2015</a:t>
             </a:fld>
             <a:endParaRPr lang="en-US"/>
           </a:p>
@@ -643,7 +643,7 @@
           <a:p>
             <a:fld id="{D9DE92D4-3454-4E80-9822-1258D18FA6E8}" type="datetimeFigureOut">
               <a:rPr lang="en-US" smtClean="0"/>
-              <a:t>2/28/2015</a:t>
+              <a:t>3/6/2015</a:t>
             </a:fld>
             <a:endParaRPr lang="en-US"/>
           </a:p>
@@ -813,7 +813,7 @@
           <a:p>
             <a:fld id="{D9DE92D4-3454-4E80-9822-1258D18FA6E8}" type="datetimeFigureOut">
               <a:rPr lang="en-US" smtClean="0"/>
-              <a:t>2/28/2015</a:t>
+              <a:t>3/6/2015</a:t>
             </a:fld>
             <a:endParaRPr lang="en-US"/>
           </a:p>
@@ -1059,7 +1059,7 @@
           <a:p>
             <a:fld id="{D9DE92D4-3454-4E80-9822-1258D18FA6E8}" type="datetimeFigureOut">
               <a:rPr lang="en-US" smtClean="0"/>
-              <a:t>2/28/2015</a:t>
+              <a:t>3/6/2015</a:t>
             </a:fld>
             <a:endParaRPr lang="en-US"/>
           </a:p>
@@ -1347,7 +1347,7 @@
           <a:p>
             <a:fld id="{D9DE92D4-3454-4E80-9822-1258D18FA6E8}" type="datetimeFigureOut">
               <a:rPr lang="en-US" smtClean="0"/>
-              <a:t>2/28/2015</a:t>
+              <a:t>3/6/2015</a:t>
             </a:fld>
             <a:endParaRPr lang="en-US"/>
           </a:p>
@@ -1774,7 +1774,7 @@
           <a:p>
             <a:fld id="{D9DE92D4-3454-4E80-9822-1258D18FA6E8}" type="datetimeFigureOut">
               <a:rPr lang="en-US" smtClean="0"/>
-              <a:t>2/28/2015</a:t>
+              <a:t>3/6/2015</a:t>
             </a:fld>
             <a:endParaRPr lang="en-US"/>
           </a:p>
@@ -1892,7 +1892,7 @@
           <a:p>
             <a:fld id="{D9DE92D4-3454-4E80-9822-1258D18FA6E8}" type="datetimeFigureOut">
               <a:rPr lang="en-US" smtClean="0"/>
-              <a:t>2/28/2015</a:t>
+              <a:t>3/6/2015</a:t>
             </a:fld>
             <a:endParaRPr lang="en-US"/>
           </a:p>
@@ -1987,7 +1987,7 @@
           <a:p>
             <a:fld id="{D9DE92D4-3454-4E80-9822-1258D18FA6E8}" type="datetimeFigureOut">
               <a:rPr lang="en-US" smtClean="0"/>
-              <a:t>2/28/2015</a:t>
+              <a:t>3/6/2015</a:t>
             </a:fld>
             <a:endParaRPr lang="en-US"/>
           </a:p>
@@ -2264,7 +2264,7 @@
           <a:p>
             <a:fld id="{D9DE92D4-3454-4E80-9822-1258D18FA6E8}" type="datetimeFigureOut">
               <a:rPr lang="en-US" smtClean="0"/>
-              <a:t>2/28/2015</a:t>
+              <a:t>3/6/2015</a:t>
             </a:fld>
             <a:endParaRPr lang="en-US"/>
           </a:p>
@@ -2517,7 +2517,7 @@
           <a:p>
             <a:fld id="{D9DE92D4-3454-4E80-9822-1258D18FA6E8}" type="datetimeFigureOut">
               <a:rPr lang="en-US" smtClean="0"/>
-              <a:t>2/28/2015</a:t>
+              <a:t>3/6/2015</a:t>
             </a:fld>
             <a:endParaRPr lang="en-US"/>
           </a:p>
@@ -2730,7 +2730,7 @@
           <a:p>
             <a:fld id="{D9DE92D4-3454-4E80-9822-1258D18FA6E8}" type="datetimeFigureOut">
               <a:rPr lang="en-US" smtClean="0"/>
-              <a:t>2/28/2015</a:t>
+              <a:t>3/6/2015</a:t>
             </a:fld>
             <a:endParaRPr lang="en-US"/>
           </a:p>
@@ -4629,14 +4629,14 @@
       </p:grpSpPr>
       <p:sp>
         <p:nvSpPr>
-          <p:cNvPr id="2" name="TextBox 1"/>
+          <p:cNvPr id="68" name="TextBox 67"/>
           <p:cNvSpPr txBox="1"/>
           <p:nvPr/>
         </p:nvSpPr>
         <p:spPr>
           <a:xfrm>
-            <a:off x="4312526" y="170126"/>
-            <a:ext cx="706959" cy="338554"/>
+            <a:off x="2188804" y="224456"/>
+            <a:ext cx="796815" cy="338554"/>
           </a:xfrm>
           <a:prstGeom prst="rect">
             <a:avLst/>
@@ -4657,7 +4657,7 @@
                 <a:latin typeface="Arial" pitchFamily="34" charset="0"/>
                 <a:cs typeface="Arial" pitchFamily="34" charset="0"/>
               </a:rPr>
-              <a:t>drop decision</a:t>
+              <a:t>remaining time</a:t>
             </a:r>
             <a:endParaRPr lang="en-US" sz="800" dirty="0">
               <a:latin typeface="Arial" pitchFamily="34" charset="0"/>
@@ -4668,14 +4668,50 @@
       </p:sp>
       <p:sp>
         <p:nvSpPr>
-          <p:cNvPr id="3" name="Rectangle 2"/>
+          <p:cNvPr id="36" name="TextBox 35"/>
+          <p:cNvSpPr txBox="1"/>
+          <p:nvPr/>
+        </p:nvSpPr>
+        <p:spPr>
+          <a:xfrm>
+            <a:off x="670719" y="228715"/>
+            <a:ext cx="1078971" cy="215444"/>
+          </a:xfrm>
+          <a:prstGeom prst="rect">
+            <a:avLst/>
+          </a:prstGeom>
+          <a:noFill/>
+        </p:spPr>
+        <p:txBody>
+          <a:bodyPr wrap="square" rtlCol="0">
+            <a:spAutoFit/>
+          </a:bodyPr>
+          <a:lstStyle/>
+          <a:p>
+            <a:r>
+              <a:rPr lang="en-US" sz="800" dirty="0" smtClean="0">
+                <a:latin typeface="Arial" pitchFamily="34" charset="0"/>
+                <a:cs typeface="Arial" pitchFamily="34" charset="0"/>
+              </a:rPr>
+              <a:t>sub-task WCET</a:t>
+            </a:r>
+            <a:endParaRPr lang="en-US" sz="800" dirty="0" smtClean="0">
+              <a:latin typeface="Arial" pitchFamily="34" charset="0"/>
+              <a:cs typeface="Arial" pitchFamily="34" charset="0"/>
+            </a:endParaRPr>
+          </a:p>
+        </p:txBody>
+      </p:sp>
+      <p:sp>
+        <p:nvSpPr>
+          <p:cNvPr id="33" name="Rectangle 32"/>
           <p:cNvSpPr/>
           <p:nvPr/>
         </p:nvSpPr>
         <p:spPr>
           <a:xfrm>
-            <a:off x="1098019" y="247861"/>
-            <a:ext cx="850899" cy="514620"/>
+            <a:off x="2786914" y="1349909"/>
+            <a:ext cx="703174" cy="375728"/>
           </a:xfrm>
           <a:prstGeom prst="rect">
             <a:avLst/>
@@ -4718,7 +4754,7 @@
                 <a:latin typeface="Arial" pitchFamily="34" charset="0"/>
                 <a:cs typeface="Arial" pitchFamily="34" charset="0"/>
               </a:rPr>
-              <a:t>Countdown Timer</a:t>
+              <a:t>FIFO</a:t>
             </a:r>
             <a:endParaRPr lang="en-US" sz="800" dirty="0">
               <a:solidFill>
@@ -4730,94 +4766,52 @@
           </a:p>
         </p:txBody>
       </p:sp>
-      <p:sp>
-        <p:nvSpPr>
-          <p:cNvPr id="5" name="TextBox 4"/>
-          <p:cNvSpPr txBox="1"/>
-          <p:nvPr/>
-        </p:nvSpPr>
-        <p:spPr>
-          <a:xfrm>
-            <a:off x="399519" y="338554"/>
-            <a:ext cx="689275" cy="338554"/>
-          </a:xfrm>
-          <a:prstGeom prst="rect">
-            <a:avLst/>
-          </a:prstGeom>
-          <a:noFill/>
-          <a:ln w="12700">
-            <a:noFill/>
+      <p:cxnSp>
+        <p:nvCxnSpPr>
+          <p:cNvPr id="35" name="Straight Arrow Connector 34"/>
+          <p:cNvCxnSpPr/>
+          <p:nvPr/>
+        </p:nvCxnSpPr>
+        <p:spPr>
+          <a:xfrm>
+            <a:off x="724834" y="424001"/>
+            <a:ext cx="802111" cy="0"/>
+          </a:xfrm>
+          <a:prstGeom prst="straightConnector1">
+            <a:avLst/>
+          </a:prstGeom>
+          <a:ln w="12700" cmpd="sng">
+            <a:solidFill>
+              <a:schemeClr val="tx1"/>
+            </a:solidFill>
+            <a:tailEnd type="triangle"/>
           </a:ln>
         </p:spPr>
-        <p:txBody>
-          <a:bodyPr wrap="square" rtlCol="0">
-            <a:spAutoFit/>
-          </a:bodyPr>
-          <a:lstStyle/>
-          <a:p>
-            <a:r>
-              <a:rPr lang="en-US" sz="800" dirty="0" smtClean="0">
-                <a:latin typeface="Arial" pitchFamily="34" charset="0"/>
-                <a:cs typeface="Arial" pitchFamily="34" charset="0"/>
-              </a:rPr>
-              <a:t>start sub-task</a:t>
-            </a:r>
-            <a:endParaRPr lang="en-US" sz="800" dirty="0">
-              <a:latin typeface="Arial" pitchFamily="34" charset="0"/>
-              <a:cs typeface="Arial" pitchFamily="34" charset="0"/>
-            </a:endParaRPr>
-          </a:p>
-        </p:txBody>
-      </p:sp>
-      <p:sp>
-        <p:nvSpPr>
-          <p:cNvPr id="7" name="TextBox 6"/>
-          <p:cNvSpPr txBox="1"/>
-          <p:nvPr/>
-        </p:nvSpPr>
-        <p:spPr>
-          <a:xfrm>
-            <a:off x="399519" y="0"/>
-            <a:ext cx="689274" cy="338554"/>
-          </a:xfrm>
-          <a:prstGeom prst="rect">
-            <a:avLst/>
-          </a:prstGeom>
-          <a:noFill/>
-          <a:ln w="12700">
-            <a:noFill/>
-          </a:ln>
-        </p:spPr>
-        <p:txBody>
-          <a:bodyPr wrap="square" rtlCol="0">
-            <a:spAutoFit/>
-          </a:bodyPr>
-          <a:lstStyle/>
-          <a:p>
-            <a:r>
-              <a:rPr lang="en-US" sz="800" dirty="0" smtClean="0">
-                <a:latin typeface="Arial" pitchFamily="34" charset="0"/>
-                <a:cs typeface="Arial" pitchFamily="34" charset="0"/>
-              </a:rPr>
-              <a:t>sub-task WCET</a:t>
-            </a:r>
-            <a:endParaRPr lang="en-US" sz="800" dirty="0">
-              <a:latin typeface="Arial" pitchFamily="34" charset="0"/>
-              <a:cs typeface="Arial" pitchFamily="34" charset="0"/>
-            </a:endParaRPr>
-          </a:p>
-        </p:txBody>
-      </p:sp>
-      <p:sp>
-        <p:nvSpPr>
-          <p:cNvPr id="8" name="Rectangle 7"/>
+        <p:style>
+          <a:lnRef idx="1">
+            <a:schemeClr val="accent1"/>
+          </a:lnRef>
+          <a:fillRef idx="0">
+            <a:schemeClr val="accent1"/>
+          </a:fillRef>
+          <a:effectRef idx="0">
+            <a:schemeClr val="accent1"/>
+          </a:effectRef>
+          <a:fontRef idx="minor">
+            <a:schemeClr val="tx1"/>
+          </a:fontRef>
+        </p:style>
+      </p:cxnSp>
+      <p:sp>
+        <p:nvSpPr>
+          <p:cNvPr id="38" name="Rectangle 37"/>
           <p:cNvSpPr/>
           <p:nvPr/>
         </p:nvSpPr>
         <p:spPr>
           <a:xfrm>
-            <a:off x="2745733" y="247860"/>
-            <a:ext cx="990600" cy="514622"/>
+            <a:off x="1526945" y="336437"/>
+            <a:ext cx="703174" cy="375728"/>
           </a:xfrm>
           <a:prstGeom prst="rect">
             <a:avLst/>
@@ -4860,9 +4854,98 @@
                 <a:latin typeface="Arial" pitchFamily="34" charset="0"/>
                 <a:cs typeface="Arial" pitchFamily="34" charset="0"/>
               </a:rPr>
-              <a:t>Dynamic</a:t>
-            </a:r>
-          </a:p>
+              <a:t>Countdown Timer</a:t>
+            </a:r>
+            <a:endParaRPr lang="en-US" sz="800" dirty="0">
+              <a:solidFill>
+                <a:sysClr val="windowText" lastClr="000000"/>
+              </a:solidFill>
+              <a:latin typeface="Arial" pitchFamily="34" charset="0"/>
+              <a:cs typeface="Arial" pitchFamily="34" charset="0"/>
+            </a:endParaRPr>
+          </a:p>
+        </p:txBody>
+      </p:sp>
+      <p:cxnSp>
+        <p:nvCxnSpPr>
+          <p:cNvPr id="39" name="Straight Arrow Connector 38"/>
+          <p:cNvCxnSpPr>
+            <a:endCxn id="33" idx="1"/>
+          </p:cNvCxnSpPr>
+          <p:nvPr/>
+        </p:nvCxnSpPr>
+        <p:spPr>
+          <a:xfrm>
+            <a:off x="728036" y="1537773"/>
+            <a:ext cx="2058878" cy="0"/>
+          </a:xfrm>
+          <a:prstGeom prst="straightConnector1">
+            <a:avLst/>
+          </a:prstGeom>
+          <a:ln w="12700">
+            <a:solidFill>
+              <a:schemeClr val="tx1"/>
+            </a:solidFill>
+            <a:tailEnd type="triangle"/>
+          </a:ln>
+        </p:spPr>
+        <p:style>
+          <a:lnRef idx="1">
+            <a:schemeClr val="accent1"/>
+          </a:lnRef>
+          <a:fillRef idx="0">
+            <a:schemeClr val="accent1"/>
+          </a:fillRef>
+          <a:effectRef idx="0">
+            <a:schemeClr val="accent1"/>
+          </a:effectRef>
+          <a:fontRef idx="minor">
+            <a:schemeClr val="tx1"/>
+          </a:fontRef>
+        </p:style>
+      </p:cxnSp>
+      <p:sp>
+        <p:nvSpPr>
+          <p:cNvPr id="42" name="Rectangle 41"/>
+          <p:cNvSpPr/>
+          <p:nvPr/>
+        </p:nvSpPr>
+        <p:spPr>
+          <a:xfrm>
+            <a:off x="4556919" y="254964"/>
+            <a:ext cx="676176" cy="1573836"/>
+          </a:xfrm>
+          <a:prstGeom prst="rect">
+            <a:avLst/>
+          </a:prstGeom>
+          <a:solidFill>
+            <a:srgbClr val="A6CEE3"/>
+          </a:solidFill>
+          <a:ln w="12700">
+            <a:solidFill>
+              <a:schemeClr val="tx1"/>
+            </a:solidFill>
+          </a:ln>
+        </p:spPr>
+        <p:style>
+          <a:lnRef idx="2">
+            <a:schemeClr val="accent1">
+              <a:shade val="50000"/>
+            </a:schemeClr>
+          </a:lnRef>
+          <a:fillRef idx="1">
+            <a:schemeClr val="accent1"/>
+          </a:fillRef>
+          <a:effectRef idx="0">
+            <a:schemeClr val="accent1"/>
+          </a:effectRef>
+          <a:fontRef idx="minor">
+            <a:schemeClr val="lt1"/>
+          </a:fontRef>
+        </p:style>
+        <p:txBody>
+          <a:bodyPr rtlCol="0" anchor="ctr"/>
+          <a:lstStyle/>
           <a:p>
             <a:pPr algn="ctr"/>
             <a:r>
@@ -4873,7 +4956,7 @@
                 <a:latin typeface="Arial" pitchFamily="34" charset="0"/>
                 <a:cs typeface="Arial" pitchFamily="34" charset="0"/>
               </a:rPr>
-              <a:t>Slack</a:t>
+              <a:t>Monitoring Core</a:t>
             </a:r>
             <a:endParaRPr lang="en-US" sz="800" dirty="0">
               <a:solidFill>
@@ -4887,14 +4970,16 @@
       </p:sp>
       <p:cxnSp>
         <p:nvCxnSpPr>
-          <p:cNvPr id="9" name="Straight Arrow Connector 8"/>
-          <p:cNvCxnSpPr/>
+          <p:cNvPr id="44" name="Straight Arrow Connector 43"/>
+          <p:cNvCxnSpPr>
+            <a:stCxn id="33" idx="3"/>
+          </p:cNvCxnSpPr>
           <p:nvPr/>
         </p:nvCxnSpPr>
         <p:spPr>
-          <a:xfrm flipV="1">
-            <a:off x="1948918" y="507830"/>
-            <a:ext cx="796815" cy="1"/>
+          <a:xfrm>
+            <a:off x="3490088" y="1537773"/>
+            <a:ext cx="1066831" cy="0"/>
           </a:xfrm>
           <a:prstGeom prst="straightConnector1">
             <a:avLst/>
@@ -4903,7 +4988,7 @@
             <a:solidFill>
               <a:schemeClr val="tx1"/>
             </a:solidFill>
-            <a:tailEnd type="triangle" w="med" len="med"/>
+            <a:tailEnd type="triangle"/>
           </a:ln>
         </p:spPr>
         <p:style>
@@ -4923,22 +5008,19 @@
       </p:cxnSp>
       <p:sp>
         <p:nvSpPr>
-          <p:cNvPr id="10" name="TextBox 9"/>
+          <p:cNvPr id="59" name="TextBox 58"/>
           <p:cNvSpPr txBox="1"/>
           <p:nvPr/>
         </p:nvSpPr>
         <p:spPr>
           <a:xfrm>
-            <a:off x="1948917" y="169277"/>
-            <a:ext cx="796815" cy="338554"/>
+            <a:off x="670719" y="444159"/>
+            <a:ext cx="875297" cy="215444"/>
           </a:xfrm>
           <a:prstGeom prst="rect">
             <a:avLst/>
           </a:prstGeom>
           <a:noFill/>
-          <a:ln w="12700">
-            <a:noFill/>
-          </a:ln>
         </p:spPr>
         <p:txBody>
           <a:bodyPr wrap="square" rtlCol="0">
@@ -4951,34 +5033,97 @@
                 <a:latin typeface="Arial" pitchFamily="34" charset="0"/>
                 <a:cs typeface="Arial" pitchFamily="34" charset="0"/>
               </a:rPr>
-              <a:t>remaining time</a:t>
-            </a:r>
-            <a:endParaRPr lang="en-US" sz="800" dirty="0">
+              <a:t>start sub-task</a:t>
+            </a:r>
+            <a:endParaRPr lang="en-US" sz="800" dirty="0" smtClean="0">
               <a:latin typeface="Arial" pitchFamily="34" charset="0"/>
               <a:cs typeface="Arial" pitchFamily="34" charset="0"/>
             </a:endParaRPr>
           </a:p>
         </p:txBody>
       </p:sp>
-      <p:cxnSp>
-        <p:nvCxnSpPr>
-          <p:cNvPr id="11" name="Straight Arrow Connector 10"/>
-          <p:cNvCxnSpPr/>
-          <p:nvPr/>
-        </p:nvCxnSpPr>
-        <p:spPr>
-          <a:xfrm>
-            <a:off x="2440932" y="677108"/>
-            <a:ext cx="304800" cy="0"/>
-          </a:xfrm>
-          <a:prstGeom prst="straightConnector1">
-            <a:avLst/>
-          </a:prstGeom>
+      <p:sp>
+        <p:nvSpPr>
+          <p:cNvPr id="61" name="Rectangle 60"/>
+          <p:cNvSpPr/>
+          <p:nvPr/>
+        </p:nvSpPr>
+        <p:spPr>
+          <a:xfrm>
+            <a:off x="2786913" y="336437"/>
+            <a:ext cx="703174" cy="375728"/>
+          </a:xfrm>
+          <a:prstGeom prst="rect">
+            <a:avLst/>
+          </a:prstGeom>
+          <a:solidFill>
+            <a:srgbClr val="FFFFCC"/>
+          </a:solidFill>
           <a:ln w="12700">
             <a:solidFill>
               <a:schemeClr val="tx1"/>
             </a:solidFill>
-            <a:tailEnd type="triangle"/>
+          </a:ln>
+        </p:spPr>
+        <p:style>
+          <a:lnRef idx="2">
+            <a:schemeClr val="accent1">
+              <a:shade val="50000"/>
+            </a:schemeClr>
+          </a:lnRef>
+          <a:fillRef idx="1">
+            <a:schemeClr val="accent1"/>
+          </a:fillRef>
+          <a:effectRef idx="0">
+            <a:schemeClr val="accent1"/>
+          </a:effectRef>
+          <a:fontRef idx="minor">
+            <a:schemeClr val="lt1"/>
+          </a:fontRef>
+        </p:style>
+        <p:txBody>
+          <a:bodyPr rtlCol="0" anchor="ctr"/>
+          <a:lstStyle/>
+          <a:p>
+            <a:pPr algn="ctr"/>
+            <a:r>
+              <a:rPr lang="en-US" sz="800" dirty="0" smtClean="0">
+                <a:solidFill>
+                  <a:sysClr val="windowText" lastClr="000000"/>
+                </a:solidFill>
+                <a:latin typeface="Arial" pitchFamily="34" charset="0"/>
+                <a:cs typeface="Arial" pitchFamily="34" charset="0"/>
+              </a:rPr>
+              <a:t>Dynamic Slack</a:t>
+            </a:r>
+            <a:endParaRPr lang="en-US" sz="800" dirty="0">
+              <a:solidFill>
+                <a:sysClr val="windowText" lastClr="000000"/>
+              </a:solidFill>
+              <a:latin typeface="Arial" pitchFamily="34" charset="0"/>
+              <a:cs typeface="Arial" pitchFamily="34" charset="0"/>
+            </a:endParaRPr>
+          </a:p>
+        </p:txBody>
+      </p:sp>
+      <p:cxnSp>
+        <p:nvCxnSpPr>
+          <p:cNvPr id="62" name="Straight Connector 61"/>
+          <p:cNvCxnSpPr/>
+          <p:nvPr/>
+        </p:nvCxnSpPr>
+        <p:spPr>
+          <a:xfrm flipH="1">
+            <a:off x="724834" y="961838"/>
+            <a:ext cx="1834240" cy="0"/>
+          </a:xfrm>
+          <a:prstGeom prst="line">
+            <a:avLst/>
+          </a:prstGeom>
+          <a:ln w="12700">
+            <a:solidFill>
+              <a:schemeClr val="tx1"/>
+            </a:solidFill>
           </a:ln>
         </p:spPr>
         <p:style>
@@ -4998,22 +5143,98 @@
       </p:cxnSp>
       <p:cxnSp>
         <p:nvCxnSpPr>
-          <p:cNvPr id="12" name="Straight Connector 11"/>
-          <p:cNvCxnSpPr/>
+          <p:cNvPr id="64" name="Straight Arrow Connector 63"/>
+          <p:cNvCxnSpPr>
+            <a:stCxn id="38" idx="3"/>
+            <a:endCxn id="61" idx="1"/>
+          </p:cNvCxnSpPr>
           <p:nvPr/>
         </p:nvCxnSpPr>
         <p:spPr>
           <a:xfrm>
-            <a:off x="2440933" y="677108"/>
-            <a:ext cx="0" cy="313356"/>
-          </a:xfrm>
-          <a:prstGeom prst="line">
+            <a:off x="2230119" y="524301"/>
+            <a:ext cx="556794" cy="0"/>
+          </a:xfrm>
+          <a:prstGeom prst="straightConnector1">
             <a:avLst/>
           </a:prstGeom>
           <a:ln w="12700">
             <a:solidFill>
               <a:schemeClr val="tx1"/>
             </a:solidFill>
+            <a:tailEnd type="triangle" w="med" len="med"/>
+          </a:ln>
+        </p:spPr>
+        <p:style>
+          <a:lnRef idx="1">
+            <a:schemeClr val="accent1"/>
+          </a:lnRef>
+          <a:fillRef idx="0">
+            <a:schemeClr val="accent1"/>
+          </a:fillRef>
+          <a:effectRef idx="0">
+            <a:schemeClr val="accent1"/>
+          </a:effectRef>
+          <a:fontRef idx="minor">
+            <a:schemeClr val="tx1"/>
+          </a:fontRef>
+        </p:style>
+      </p:cxnSp>
+      <p:sp>
+        <p:nvSpPr>
+          <p:cNvPr id="70" name="TextBox 69"/>
+          <p:cNvSpPr txBox="1"/>
+          <p:nvPr/>
+        </p:nvSpPr>
+        <p:spPr>
+          <a:xfrm>
+            <a:off x="670719" y="758802"/>
+            <a:ext cx="821659" cy="215444"/>
+          </a:xfrm>
+          <a:prstGeom prst="rect">
+            <a:avLst/>
+          </a:prstGeom>
+          <a:noFill/>
+        </p:spPr>
+        <p:txBody>
+          <a:bodyPr wrap="square" rtlCol="0">
+            <a:spAutoFit/>
+          </a:bodyPr>
+          <a:lstStyle/>
+          <a:p>
+            <a:r>
+              <a:rPr lang="en-US" sz="800" dirty="0" smtClean="0">
+                <a:latin typeface="Arial" pitchFamily="34" charset="0"/>
+                <a:cs typeface="Arial" pitchFamily="34" charset="0"/>
+              </a:rPr>
+              <a:t>end sub-task</a:t>
+            </a:r>
+            <a:endParaRPr lang="en-US" sz="800" dirty="0" smtClean="0">
+              <a:latin typeface="Arial" pitchFamily="34" charset="0"/>
+              <a:cs typeface="Arial" pitchFamily="34" charset="0"/>
+            </a:endParaRPr>
+          </a:p>
+        </p:txBody>
+      </p:sp>
+      <p:cxnSp>
+        <p:nvCxnSpPr>
+          <p:cNvPr id="78" name="Straight Arrow Connector 77"/>
+          <p:cNvCxnSpPr/>
+          <p:nvPr/>
+        </p:nvCxnSpPr>
+        <p:spPr>
+          <a:xfrm>
+            <a:off x="724833" y="640724"/>
+            <a:ext cx="802111" cy="0"/>
+          </a:xfrm>
+          <a:prstGeom prst="straightConnector1">
+            <a:avLst/>
+          </a:prstGeom>
+          <a:ln w="12700" cmpd="sng">
+            <a:solidFill>
+              <a:schemeClr val="tx1"/>
+            </a:solidFill>
+            <a:tailEnd type="triangle"/>
           </a:ln>
         </p:spPr>
         <p:style>
@@ -5033,22 +5254,23 @@
       </p:cxnSp>
       <p:cxnSp>
         <p:nvCxnSpPr>
-          <p:cNvPr id="13" name="Straight Connector 12"/>
+          <p:cNvPr id="81" name="Straight Arrow Connector 80"/>
           <p:cNvCxnSpPr/>
           <p:nvPr/>
         </p:nvCxnSpPr>
         <p:spPr>
-          <a:xfrm flipH="1">
-            <a:off x="394065" y="990464"/>
-            <a:ext cx="2046869" cy="0"/>
-          </a:xfrm>
-          <a:prstGeom prst="line">
+          <a:xfrm>
+            <a:off x="2559074" y="640724"/>
+            <a:ext cx="227839" cy="0"/>
+          </a:xfrm>
+          <a:prstGeom prst="straightConnector1">
             <a:avLst/>
           </a:prstGeom>
           <a:ln w="12700">
             <a:solidFill>
               <a:schemeClr val="tx1"/>
             </a:solidFill>
+            <a:tailEnd type="triangle"/>
           </a:ln>
         </p:spPr>
         <p:style>
@@ -5066,67 +5288,24 @@
           </a:fontRef>
         </p:style>
       </p:cxnSp>
-      <p:sp>
-        <p:nvSpPr>
-          <p:cNvPr id="14" name="TextBox 13"/>
-          <p:cNvSpPr txBox="1"/>
-          <p:nvPr/>
-        </p:nvSpPr>
-        <p:spPr>
-          <a:xfrm>
-            <a:off x="399519" y="775020"/>
-            <a:ext cx="1000342" cy="215444"/>
-          </a:xfrm>
-          <a:prstGeom prst="rect">
-            <a:avLst/>
-          </a:prstGeom>
-          <a:noFill/>
-          <a:ln w="12700">
-            <a:noFill/>
-          </a:ln>
-        </p:spPr>
-        <p:txBody>
-          <a:bodyPr wrap="square" rtlCol="0">
-            <a:spAutoFit/>
-          </a:bodyPr>
-          <a:lstStyle/>
-          <a:p>
-            <a:r>
-              <a:rPr lang="en-US" sz="800" dirty="0" smtClean="0">
-                <a:latin typeface="Arial" pitchFamily="34" charset="0"/>
-                <a:cs typeface="Arial" pitchFamily="34" charset="0"/>
-              </a:rPr>
-              <a:t>end sub-task</a:t>
-            </a:r>
-            <a:endParaRPr lang="en-US" sz="800" dirty="0">
-              <a:latin typeface="Arial" pitchFamily="34" charset="0"/>
-              <a:cs typeface="Arial" pitchFamily="34" charset="0"/>
-            </a:endParaRPr>
-          </a:p>
-        </p:txBody>
-      </p:sp>
       <p:cxnSp>
         <p:nvCxnSpPr>
-          <p:cNvPr id="15" name="Straight Arrow Connector 14"/>
-          <p:cNvCxnSpPr>
-            <a:stCxn id="8" idx="3"/>
-            <a:endCxn id="17" idx="2"/>
-          </p:cNvCxnSpPr>
+          <p:cNvPr id="83" name="Straight Connector 82"/>
+          <p:cNvCxnSpPr/>
           <p:nvPr/>
         </p:nvCxnSpPr>
         <p:spPr>
           <a:xfrm>
-            <a:off x="3736333" y="505171"/>
-            <a:ext cx="226431" cy="3509"/>
-          </a:xfrm>
-          <a:prstGeom prst="straightConnector1">
+            <a:off x="2559074" y="640724"/>
+            <a:ext cx="0" cy="313356"/>
+          </a:xfrm>
+          <a:prstGeom prst="line">
             <a:avLst/>
           </a:prstGeom>
           <a:ln w="12700">
             <a:solidFill>
               <a:schemeClr val="tx1"/>
             </a:solidFill>
-            <a:tailEnd type="triangle"/>
           </a:ln>
         </p:spPr>
         <p:style>
@@ -5146,16 +5325,16 @@
       </p:cxnSp>
       <p:sp>
         <p:nvSpPr>
-          <p:cNvPr id="16" name="Rectangle 15"/>
+          <p:cNvPr id="85" name="Oval 84"/>
           <p:cNvSpPr/>
           <p:nvPr/>
         </p:nvSpPr>
         <p:spPr>
           <a:xfrm>
-            <a:off x="2745733" y="858492"/>
-            <a:ext cx="988431" cy="257115"/>
-          </a:xfrm>
-          <a:prstGeom prst="rect">
+            <a:off x="3770191" y="427673"/>
+            <a:ext cx="192573" cy="193255"/>
+          </a:xfrm>
+          <a:prstGeom prst="ellipse">
             <a:avLst/>
           </a:prstGeom>
           <a:solidFill>
@@ -5189,6 +5368,419 @@
           <a:p>
             <a:pPr algn="ctr"/>
             <a:r>
+              <a:rPr lang="en-US" sz="800" b="1" dirty="0" smtClean="0">
+                <a:solidFill>
+                  <a:schemeClr val="tx1"/>
+                </a:solidFill>
+                <a:latin typeface="Arial" pitchFamily="34" charset="0"/>
+                <a:cs typeface="Arial" pitchFamily="34" charset="0"/>
+              </a:rPr>
+              <a:t>&gt;</a:t>
+            </a:r>
+            <a:endParaRPr lang="en-US" sz="800" b="1" dirty="0">
+              <a:solidFill>
+                <a:schemeClr val="tx1"/>
+              </a:solidFill>
+              <a:latin typeface="Arial" pitchFamily="34" charset="0"/>
+              <a:cs typeface="Arial" pitchFamily="34" charset="0"/>
+            </a:endParaRPr>
+          </a:p>
+        </p:txBody>
+      </p:sp>
+      <p:cxnSp>
+        <p:nvCxnSpPr>
+          <p:cNvPr id="105" name="Straight Arrow Connector 104"/>
+          <p:cNvCxnSpPr/>
+          <p:nvPr/>
+        </p:nvCxnSpPr>
+        <p:spPr>
+          <a:xfrm>
+            <a:off x="3493090" y="533002"/>
+            <a:ext cx="277101" cy="0"/>
+          </a:xfrm>
+          <a:prstGeom prst="straightConnector1">
+            <a:avLst/>
+          </a:prstGeom>
+          <a:ln w="12700">
+            <a:solidFill>
+              <a:schemeClr val="tx1"/>
+            </a:solidFill>
+            <a:tailEnd type="triangle"/>
+          </a:ln>
+        </p:spPr>
+        <p:style>
+          <a:lnRef idx="1">
+            <a:schemeClr val="accent1"/>
+          </a:lnRef>
+          <a:fillRef idx="0">
+            <a:schemeClr val="accent1"/>
+          </a:fillRef>
+          <a:effectRef idx="0">
+            <a:schemeClr val="accent1"/>
+          </a:effectRef>
+          <a:fontRef idx="minor">
+            <a:schemeClr val="tx1"/>
+          </a:fontRef>
+        </p:style>
+      </p:cxnSp>
+      <p:sp>
+        <p:nvSpPr>
+          <p:cNvPr id="106" name="Rectangle 105"/>
+          <p:cNvSpPr/>
+          <p:nvPr/>
+        </p:nvSpPr>
+        <p:spPr>
+          <a:xfrm>
+            <a:off x="51859" y="254962"/>
+            <a:ext cx="676177" cy="1573837"/>
+          </a:xfrm>
+          <a:prstGeom prst="rect">
+            <a:avLst/>
+          </a:prstGeom>
+          <a:solidFill>
+            <a:srgbClr val="A6CEE3"/>
+          </a:solidFill>
+          <a:ln w="12700">
+            <a:solidFill>
+              <a:schemeClr val="tx1"/>
+            </a:solidFill>
+          </a:ln>
+        </p:spPr>
+        <p:style>
+          <a:lnRef idx="2">
+            <a:schemeClr val="accent1">
+              <a:shade val="50000"/>
+            </a:schemeClr>
+          </a:lnRef>
+          <a:fillRef idx="1">
+            <a:schemeClr val="accent1"/>
+          </a:fillRef>
+          <a:effectRef idx="0">
+            <a:schemeClr val="accent1"/>
+          </a:effectRef>
+          <a:fontRef idx="minor">
+            <a:schemeClr val="lt1"/>
+          </a:fontRef>
+        </p:style>
+        <p:txBody>
+          <a:bodyPr rtlCol="0" anchor="ctr"/>
+          <a:lstStyle/>
+          <a:p>
+            <a:pPr algn="ctr"/>
+            <a:r>
+              <a:rPr lang="en-US" sz="800" dirty="0" smtClean="0">
+                <a:solidFill>
+                  <a:sysClr val="windowText" lastClr="000000"/>
+                </a:solidFill>
+                <a:latin typeface="Arial" pitchFamily="34" charset="0"/>
+                <a:cs typeface="Arial" pitchFamily="34" charset="0"/>
+              </a:rPr>
+              <a:t>Main</a:t>
+            </a:r>
+          </a:p>
+          <a:p>
+            <a:pPr algn="ctr"/>
+            <a:r>
+              <a:rPr lang="en-US" sz="800" dirty="0" smtClean="0">
+                <a:solidFill>
+                  <a:sysClr val="windowText" lastClr="000000"/>
+                </a:solidFill>
+                <a:latin typeface="Arial" pitchFamily="34" charset="0"/>
+                <a:cs typeface="Arial" pitchFamily="34" charset="0"/>
+              </a:rPr>
+              <a:t>Core</a:t>
+            </a:r>
+            <a:endParaRPr lang="en-US" sz="800" dirty="0">
+              <a:solidFill>
+                <a:sysClr val="windowText" lastClr="000000"/>
+              </a:solidFill>
+              <a:latin typeface="Arial" pitchFamily="34" charset="0"/>
+              <a:cs typeface="Arial" pitchFamily="34" charset="0"/>
+            </a:endParaRPr>
+          </a:p>
+        </p:txBody>
+      </p:sp>
+      <p:cxnSp>
+        <p:nvCxnSpPr>
+          <p:cNvPr id="107" name="Straight Arrow Connector 106"/>
+          <p:cNvCxnSpPr/>
+          <p:nvPr/>
+        </p:nvCxnSpPr>
+        <p:spPr>
+          <a:xfrm>
+            <a:off x="3964559" y="533002"/>
+            <a:ext cx="592360" cy="0"/>
+          </a:xfrm>
+          <a:prstGeom prst="straightConnector1">
+            <a:avLst/>
+          </a:prstGeom>
+          <a:ln w="12700">
+            <a:solidFill>
+              <a:schemeClr val="tx1"/>
+            </a:solidFill>
+            <a:tailEnd type="triangle"/>
+          </a:ln>
+        </p:spPr>
+        <p:style>
+          <a:lnRef idx="1">
+            <a:schemeClr val="accent1"/>
+          </a:lnRef>
+          <a:fillRef idx="0">
+            <a:schemeClr val="accent1"/>
+          </a:fillRef>
+          <a:effectRef idx="0">
+            <a:schemeClr val="accent1"/>
+          </a:effectRef>
+          <a:fontRef idx="minor">
+            <a:schemeClr val="tx1"/>
+          </a:fontRef>
+        </p:style>
+      </p:cxnSp>
+      <p:sp>
+        <p:nvSpPr>
+          <p:cNvPr id="109" name="TextBox 108"/>
+          <p:cNvSpPr txBox="1"/>
+          <p:nvPr/>
+        </p:nvSpPr>
+        <p:spPr>
+          <a:xfrm>
+            <a:off x="3922062" y="224456"/>
+            <a:ext cx="706959" cy="338554"/>
+          </a:xfrm>
+          <a:prstGeom prst="rect">
+            <a:avLst/>
+          </a:prstGeom>
+          <a:noFill/>
+          <a:ln w="12700">
+            <a:noFill/>
+          </a:ln>
+        </p:spPr>
+        <p:txBody>
+          <a:bodyPr wrap="square" rtlCol="0">
+            <a:spAutoFit/>
+          </a:bodyPr>
+          <a:lstStyle/>
+          <a:p>
+            <a:r>
+              <a:rPr lang="en-US" sz="800" dirty="0" smtClean="0">
+                <a:latin typeface="Arial" pitchFamily="34" charset="0"/>
+                <a:cs typeface="Arial" pitchFamily="34" charset="0"/>
+              </a:rPr>
+              <a:t>drop decision</a:t>
+            </a:r>
+            <a:endParaRPr lang="en-US" sz="800" dirty="0">
+              <a:latin typeface="Arial" pitchFamily="34" charset="0"/>
+              <a:cs typeface="Arial" pitchFamily="34" charset="0"/>
+            </a:endParaRPr>
+          </a:p>
+        </p:txBody>
+      </p:sp>
+      <p:cxnSp>
+        <p:nvCxnSpPr>
+          <p:cNvPr id="120" name="Straight Arrow Connector 119"/>
+          <p:cNvCxnSpPr>
+            <a:stCxn id="33" idx="0"/>
+            <a:endCxn id="61" idx="2"/>
+          </p:cNvCxnSpPr>
+          <p:nvPr/>
+        </p:nvCxnSpPr>
+        <p:spPr>
+          <a:xfrm flipH="1" flipV="1">
+            <a:off x="3138500" y="712165"/>
+            <a:ext cx="1" cy="637744"/>
+          </a:xfrm>
+          <a:prstGeom prst="straightConnector1">
+            <a:avLst/>
+          </a:prstGeom>
+          <a:ln w="12700">
+            <a:solidFill>
+              <a:schemeClr val="tx1"/>
+            </a:solidFill>
+            <a:tailEnd type="triangle"/>
+          </a:ln>
+        </p:spPr>
+        <p:style>
+          <a:lnRef idx="1">
+            <a:schemeClr val="accent1"/>
+          </a:lnRef>
+          <a:fillRef idx="0">
+            <a:schemeClr val="accent1"/>
+          </a:fillRef>
+          <a:effectRef idx="0">
+            <a:schemeClr val="accent1"/>
+          </a:effectRef>
+          <a:fontRef idx="minor">
+            <a:schemeClr val="tx1"/>
+          </a:fontRef>
+        </p:style>
+      </p:cxnSp>
+      <p:sp>
+        <p:nvSpPr>
+          <p:cNvPr id="124" name="TextBox 123"/>
+          <p:cNvSpPr txBox="1"/>
+          <p:nvPr/>
+        </p:nvSpPr>
+        <p:spPr>
+          <a:xfrm>
+            <a:off x="2818857" y="923315"/>
+            <a:ext cx="459319" cy="215444"/>
+          </a:xfrm>
+          <a:prstGeom prst="rect">
+            <a:avLst/>
+          </a:prstGeom>
+          <a:noFill/>
+          <a:ln w="12700">
+            <a:noFill/>
+          </a:ln>
+        </p:spPr>
+        <p:txBody>
+          <a:bodyPr wrap="square" rtlCol="0">
+            <a:spAutoFit/>
+          </a:bodyPr>
+          <a:lstStyle/>
+          <a:p>
+            <a:r>
+              <a:rPr lang="en-US" sz="800" dirty="0" smtClean="0">
+                <a:latin typeface="Arial" pitchFamily="34" charset="0"/>
+                <a:cs typeface="Arial" pitchFamily="34" charset="0"/>
+              </a:rPr>
+              <a:t>stall</a:t>
+            </a:r>
+            <a:endParaRPr lang="en-US" sz="800" dirty="0">
+              <a:latin typeface="Arial" pitchFamily="34" charset="0"/>
+              <a:cs typeface="Arial" pitchFamily="34" charset="0"/>
+            </a:endParaRPr>
+          </a:p>
+        </p:txBody>
+      </p:sp>
+      <p:cxnSp>
+        <p:nvCxnSpPr>
+          <p:cNvPr id="125" name="Straight Arrow Connector 124"/>
+          <p:cNvCxnSpPr/>
+          <p:nvPr/>
+        </p:nvCxnSpPr>
+        <p:spPr>
+          <a:xfrm>
+            <a:off x="3138500" y="185659"/>
+            <a:ext cx="0" cy="150778"/>
+          </a:xfrm>
+          <a:prstGeom prst="straightConnector1">
+            <a:avLst/>
+          </a:prstGeom>
+          <a:ln w="12700">
+            <a:solidFill>
+              <a:schemeClr val="tx1"/>
+            </a:solidFill>
+            <a:tailEnd type="triangle"/>
+          </a:ln>
+        </p:spPr>
+        <p:style>
+          <a:lnRef idx="1">
+            <a:schemeClr val="accent1"/>
+          </a:lnRef>
+          <a:fillRef idx="0">
+            <a:schemeClr val="accent1"/>
+          </a:fillRef>
+          <a:effectRef idx="0">
+            <a:schemeClr val="accent1"/>
+          </a:effectRef>
+          <a:fontRef idx="minor">
+            <a:schemeClr val="tx1"/>
+          </a:fontRef>
+        </p:style>
+      </p:cxnSp>
+      <p:sp>
+        <p:nvSpPr>
+          <p:cNvPr id="128" name="TextBox 127"/>
+          <p:cNvSpPr txBox="1"/>
+          <p:nvPr/>
+        </p:nvSpPr>
+        <p:spPr>
+          <a:xfrm>
+            <a:off x="2694309" y="0"/>
+            <a:ext cx="888382" cy="215444"/>
+          </a:xfrm>
+          <a:prstGeom prst="rect">
+            <a:avLst/>
+          </a:prstGeom>
+          <a:noFill/>
+          <a:ln w="12700">
+            <a:noFill/>
+          </a:ln>
+        </p:spPr>
+        <p:txBody>
+          <a:bodyPr wrap="square" rtlCol="0">
+            <a:spAutoFit/>
+          </a:bodyPr>
+          <a:lstStyle/>
+          <a:p>
+            <a:pPr algn="ctr"/>
+            <a:r>
+              <a:rPr lang="en-US" sz="800" dirty="0" err="1" smtClean="0">
+                <a:latin typeface="Arial" pitchFamily="34" charset="0"/>
+                <a:cs typeface="Arial" pitchFamily="34" charset="0"/>
+              </a:rPr>
+              <a:t>headstart</a:t>
+            </a:r>
+            <a:r>
+              <a:rPr lang="en-US" sz="800" dirty="0" smtClean="0">
+                <a:latin typeface="Arial" pitchFamily="34" charset="0"/>
+                <a:cs typeface="Arial" pitchFamily="34" charset="0"/>
+              </a:rPr>
+              <a:t> slack</a:t>
+            </a:r>
+            <a:endParaRPr lang="en-US" sz="800" dirty="0">
+              <a:latin typeface="Arial" pitchFamily="34" charset="0"/>
+              <a:cs typeface="Arial" pitchFamily="34" charset="0"/>
+            </a:endParaRPr>
+          </a:p>
+        </p:txBody>
+      </p:sp>
+      <p:sp>
+        <p:nvSpPr>
+          <p:cNvPr id="129" name="Rectangle 128"/>
+          <p:cNvSpPr/>
+          <p:nvPr/>
+        </p:nvSpPr>
+        <p:spPr>
+          <a:xfrm>
+            <a:off x="3514890" y="854016"/>
+            <a:ext cx="703174" cy="375728"/>
+          </a:xfrm>
+          <a:prstGeom prst="rect">
+            <a:avLst/>
+          </a:prstGeom>
+          <a:solidFill>
+            <a:srgbClr val="FFFFCC"/>
+          </a:solidFill>
+          <a:ln w="12700">
+            <a:solidFill>
+              <a:schemeClr val="tx1"/>
+            </a:solidFill>
+          </a:ln>
+        </p:spPr>
+        <p:style>
+          <a:lnRef idx="2">
+            <a:schemeClr val="accent1">
+              <a:shade val="50000"/>
+            </a:schemeClr>
+          </a:lnRef>
+          <a:fillRef idx="1">
+            <a:schemeClr val="accent1"/>
+          </a:fillRef>
+          <a:effectRef idx="0">
+            <a:schemeClr val="accent1"/>
+          </a:effectRef>
+          <a:fontRef idx="minor">
+            <a:schemeClr val="lt1"/>
+          </a:fontRef>
+        </p:style>
+        <p:txBody>
+          <a:bodyPr rtlCol="0" anchor="ctr"/>
+          <a:lstStyle/>
+          <a:p>
+            <a:pPr algn="ctr"/>
+            <a:r>
               <a:rPr lang="en-US" sz="800" dirty="0" smtClean="0">
                 <a:solidFill>
                   <a:sysClr val="windowText" lastClr="000000"/>
@@ -5208,88 +5800,28 @@
           </a:p>
         </p:txBody>
       </p:sp>
-      <p:sp>
-        <p:nvSpPr>
-          <p:cNvPr id="17" name="Oval 16"/>
-          <p:cNvSpPr/>
-          <p:nvPr/>
-        </p:nvSpPr>
-        <p:spPr>
-          <a:xfrm>
-            <a:off x="3962764" y="328603"/>
-            <a:ext cx="358881" cy="360153"/>
-          </a:xfrm>
-          <a:prstGeom prst="ellipse">
-            <a:avLst/>
-          </a:prstGeom>
-          <a:solidFill>
-            <a:srgbClr val="FFFFCC"/>
-          </a:solidFill>
+      <p:cxnSp>
+        <p:nvCxnSpPr>
+          <p:cNvPr id="131" name="Straight Arrow Connector 130"/>
+          <p:cNvCxnSpPr>
+            <a:stCxn id="42" idx="1"/>
+            <a:endCxn id="129" idx="3"/>
+          </p:cNvCxnSpPr>
+          <p:nvPr/>
+        </p:nvCxnSpPr>
+        <p:spPr>
+          <a:xfrm flipH="1" flipV="1">
+            <a:off x="4218064" y="1041880"/>
+            <a:ext cx="338855" cy="2"/>
+          </a:xfrm>
+          <a:prstGeom prst="straightConnector1">
+            <a:avLst/>
+          </a:prstGeom>
           <a:ln w="12700">
             <a:solidFill>
               <a:schemeClr val="tx1"/>
             </a:solidFill>
-          </a:ln>
-        </p:spPr>
-        <p:style>
-          <a:lnRef idx="2">
-            <a:schemeClr val="accent1">
-              <a:shade val="50000"/>
-            </a:schemeClr>
-          </a:lnRef>
-          <a:fillRef idx="1">
-            <a:schemeClr val="accent1"/>
-          </a:fillRef>
-          <a:effectRef idx="0">
-            <a:schemeClr val="accent1"/>
-          </a:effectRef>
-          <a:fontRef idx="minor">
-            <a:schemeClr val="lt1"/>
-          </a:fontRef>
-        </p:style>
-        <p:txBody>
-          <a:bodyPr rtlCol="0" anchor="ctr"/>
-          <a:lstStyle/>
-          <a:p>
-            <a:pPr algn="ctr"/>
-            <a:r>
-              <a:rPr lang="en-US" sz="800" b="1" dirty="0" smtClean="0">
-                <a:solidFill>
-                  <a:schemeClr val="tx1"/>
-                </a:solidFill>
-                <a:latin typeface="Arial" pitchFamily="34" charset="0"/>
-                <a:cs typeface="Arial" pitchFamily="34" charset="0"/>
-              </a:rPr>
-              <a:t>&gt;</a:t>
-            </a:r>
-            <a:endParaRPr lang="en-US" sz="800" b="1" dirty="0">
-              <a:solidFill>
-                <a:schemeClr val="tx1"/>
-              </a:solidFill>
-              <a:latin typeface="Arial" pitchFamily="34" charset="0"/>
-              <a:cs typeface="Arial" pitchFamily="34" charset="0"/>
-            </a:endParaRPr>
-          </a:p>
-        </p:txBody>
-      </p:sp>
-      <p:cxnSp>
-        <p:nvCxnSpPr>
-          <p:cNvPr id="18" name="Straight Connector 17"/>
-          <p:cNvCxnSpPr/>
-          <p:nvPr/>
-        </p:nvCxnSpPr>
-        <p:spPr>
-          <a:xfrm flipH="1" flipV="1">
-            <a:off x="3737946" y="948428"/>
-            <a:ext cx="404258" cy="196"/>
-          </a:xfrm>
-          <a:prstGeom prst="line">
-            <a:avLst/>
-          </a:prstGeom>
-          <a:ln w="12700">
-            <a:solidFill>
-              <a:schemeClr val="tx1"/>
-            </a:solidFill>
+            <a:tailEnd type="triangle"/>
           </a:ln>
         </p:spPr>
         <p:style>
@@ -5309,368 +5841,17 @@
       </p:cxnSp>
       <p:cxnSp>
         <p:nvCxnSpPr>
-          <p:cNvPr id="19" name="Straight Arrow Connector 18"/>
+          <p:cNvPr id="135" name="Straight Arrow Connector 134"/>
           <p:cNvCxnSpPr>
-            <a:endCxn id="17" idx="4"/>
+            <a:stCxn id="129" idx="0"/>
+            <a:endCxn id="85" idx="4"/>
           </p:cNvCxnSpPr>
           <p:nvPr/>
         </p:nvCxnSpPr>
         <p:spPr>
           <a:xfrm flipV="1">
-            <a:off x="4142205" y="688756"/>
-            <a:ext cx="0" cy="259868"/>
-          </a:xfrm>
-          <a:prstGeom prst="straightConnector1">
-            <a:avLst/>
-          </a:prstGeom>
-          <a:ln w="12700">
-            <a:solidFill>
-              <a:schemeClr val="tx1"/>
-            </a:solidFill>
-            <a:tailEnd type="triangle"/>
-          </a:ln>
-        </p:spPr>
-        <p:style>
-          <a:lnRef idx="1">
-            <a:schemeClr val="accent1"/>
-          </a:lnRef>
-          <a:fillRef idx="0">
-            <a:schemeClr val="accent1"/>
-          </a:fillRef>
-          <a:effectRef idx="0">
-            <a:schemeClr val="accent1"/>
-          </a:effectRef>
-          <a:fontRef idx="minor">
-            <a:schemeClr val="tx1"/>
-          </a:fontRef>
-        </p:style>
-      </p:cxnSp>
-      <p:cxnSp>
-        <p:nvCxnSpPr>
-          <p:cNvPr id="20" name="Straight Arrow Connector 19"/>
-          <p:cNvCxnSpPr>
-            <a:stCxn id="17" idx="6"/>
-          </p:cNvCxnSpPr>
-          <p:nvPr/>
-        </p:nvCxnSpPr>
-        <p:spPr>
-          <a:xfrm>
-            <a:off x="4321645" y="508680"/>
-            <a:ext cx="569244" cy="0"/>
-          </a:xfrm>
-          <a:prstGeom prst="straightConnector1">
-            <a:avLst/>
-          </a:prstGeom>
-          <a:ln w="12700">
-            <a:solidFill>
-              <a:schemeClr val="tx1"/>
-            </a:solidFill>
-            <a:tailEnd type="triangle"/>
-          </a:ln>
-        </p:spPr>
-        <p:style>
-          <a:lnRef idx="1">
-            <a:schemeClr val="accent1"/>
-          </a:lnRef>
-          <a:fillRef idx="0">
-            <a:schemeClr val="accent1"/>
-          </a:fillRef>
-          <a:effectRef idx="0">
-            <a:schemeClr val="accent1"/>
-          </a:effectRef>
-          <a:fontRef idx="minor">
-            <a:schemeClr val="tx1"/>
-          </a:fontRef>
-        </p:style>
-      </p:cxnSp>
-      <p:cxnSp>
-        <p:nvCxnSpPr>
-          <p:cNvPr id="21" name="Straight Arrow Connector 20"/>
-          <p:cNvCxnSpPr/>
-          <p:nvPr/>
-        </p:nvCxnSpPr>
-        <p:spPr>
-          <a:xfrm flipH="1">
-            <a:off x="3734164" y="1024628"/>
-            <a:ext cx="1156725" cy="0"/>
-          </a:xfrm>
-          <a:prstGeom prst="straightConnector1">
-            <a:avLst/>
-          </a:prstGeom>
-          <a:ln w="12700">
-            <a:solidFill>
-              <a:schemeClr val="tx1"/>
-            </a:solidFill>
-            <a:tailEnd type="triangle"/>
-          </a:ln>
-        </p:spPr>
-        <p:style>
-          <a:lnRef idx="1">
-            <a:schemeClr val="accent1"/>
-          </a:lnRef>
-          <a:fillRef idx="0">
-            <a:schemeClr val="accent1"/>
-          </a:fillRef>
-          <a:effectRef idx="0">
-            <a:schemeClr val="accent1"/>
-          </a:effectRef>
-          <a:fontRef idx="minor">
-            <a:schemeClr val="tx1"/>
-          </a:fontRef>
-        </p:style>
-      </p:cxnSp>
-      <p:cxnSp>
-        <p:nvCxnSpPr>
-          <p:cNvPr id="22" name="Straight Arrow Connector 21"/>
-          <p:cNvCxnSpPr>
-            <a:endCxn id="8" idx="0"/>
-          </p:cNvCxnSpPr>
-          <p:nvPr/>
-        </p:nvCxnSpPr>
-        <p:spPr>
-          <a:xfrm>
-            <a:off x="3241033" y="47636"/>
-            <a:ext cx="0" cy="200224"/>
-          </a:xfrm>
-          <a:prstGeom prst="straightConnector1">
-            <a:avLst/>
-          </a:prstGeom>
-          <a:ln w="12700">
-            <a:solidFill>
-              <a:schemeClr val="tx1"/>
-            </a:solidFill>
-            <a:tailEnd type="triangle"/>
-          </a:ln>
-        </p:spPr>
-        <p:style>
-          <a:lnRef idx="1">
-            <a:schemeClr val="accent1"/>
-          </a:lnRef>
-          <a:fillRef idx="0">
-            <a:schemeClr val="accent1"/>
-          </a:fillRef>
-          <a:effectRef idx="0">
-            <a:schemeClr val="accent1"/>
-          </a:effectRef>
-          <a:fontRef idx="minor">
-            <a:schemeClr val="tx1"/>
-          </a:fontRef>
-        </p:style>
-      </p:cxnSp>
-      <p:sp>
-        <p:nvSpPr>
-          <p:cNvPr id="23" name="TextBox 22"/>
-          <p:cNvSpPr txBox="1"/>
-          <p:nvPr/>
-        </p:nvSpPr>
-        <p:spPr>
-          <a:xfrm>
-            <a:off x="2766442" y="32416"/>
-            <a:ext cx="474591" cy="215444"/>
-          </a:xfrm>
-          <a:prstGeom prst="rect">
-            <a:avLst/>
-          </a:prstGeom>
-          <a:noFill/>
-          <a:ln w="12700">
-            <a:noFill/>
-          </a:ln>
-        </p:spPr>
-        <p:txBody>
-          <a:bodyPr wrap="square" rtlCol="0">
-            <a:spAutoFit/>
-          </a:bodyPr>
-          <a:lstStyle/>
-          <a:p>
-            <a:pPr algn="r"/>
-            <a:r>
-              <a:rPr lang="en-US" sz="800" dirty="0" smtClean="0">
-                <a:latin typeface="Arial" pitchFamily="34" charset="0"/>
-                <a:cs typeface="Arial" pitchFamily="34" charset="0"/>
-              </a:rPr>
-              <a:t>stall</a:t>
-            </a:r>
-            <a:endParaRPr lang="en-US" sz="800" dirty="0">
-              <a:latin typeface="Arial" pitchFamily="34" charset="0"/>
-              <a:cs typeface="Arial" pitchFamily="34" charset="0"/>
-            </a:endParaRPr>
-          </a:p>
-        </p:txBody>
-      </p:sp>
-      <p:sp>
-        <p:nvSpPr>
-          <p:cNvPr id="24" name="Rectangle 23"/>
-          <p:cNvSpPr/>
-          <p:nvPr/>
-        </p:nvSpPr>
-        <p:spPr>
-          <a:xfrm>
-            <a:off x="51859" y="59949"/>
-            <a:ext cx="342206" cy="1083051"/>
-          </a:xfrm>
-          <a:prstGeom prst="rect">
-            <a:avLst/>
-          </a:prstGeom>
-          <a:solidFill>
-            <a:srgbClr val="A6CEE3"/>
-          </a:solidFill>
-          <a:ln w="12700">
-            <a:solidFill>
-              <a:schemeClr val="tx1"/>
-            </a:solidFill>
-          </a:ln>
-        </p:spPr>
-        <p:style>
-          <a:lnRef idx="2">
-            <a:schemeClr val="accent1">
-              <a:shade val="50000"/>
-            </a:schemeClr>
-          </a:lnRef>
-          <a:fillRef idx="1">
-            <a:schemeClr val="accent1"/>
-          </a:fillRef>
-          <a:effectRef idx="0">
-            <a:schemeClr val="accent1"/>
-          </a:effectRef>
-          <a:fontRef idx="minor">
-            <a:schemeClr val="lt1"/>
-          </a:fontRef>
-        </p:style>
-        <p:txBody>
-          <a:bodyPr vert="vert270" rtlCol="0" anchor="ctr"/>
-          <a:lstStyle/>
-          <a:p>
-            <a:pPr algn="ctr"/>
-            <a:r>
-              <a:rPr lang="en-US" sz="800" dirty="0" smtClean="0">
-                <a:solidFill>
-                  <a:sysClr val="windowText" lastClr="000000"/>
-                </a:solidFill>
-                <a:latin typeface="Arial" pitchFamily="34" charset="0"/>
-                <a:cs typeface="Arial" pitchFamily="34" charset="0"/>
-              </a:rPr>
-              <a:t>Main Core</a:t>
-            </a:r>
-            <a:endParaRPr lang="en-US" sz="800" dirty="0">
-              <a:solidFill>
-                <a:sysClr val="windowText" lastClr="000000"/>
-              </a:solidFill>
-              <a:latin typeface="Arial" pitchFamily="34" charset="0"/>
-              <a:cs typeface="Arial" pitchFamily="34" charset="0"/>
-            </a:endParaRPr>
-          </a:p>
-        </p:txBody>
-      </p:sp>
-      <p:sp>
-        <p:nvSpPr>
-          <p:cNvPr id="25" name="Rectangle 24"/>
-          <p:cNvSpPr/>
-          <p:nvPr/>
-        </p:nvSpPr>
-        <p:spPr>
-          <a:xfrm>
-            <a:off x="4890889" y="58287"/>
-            <a:ext cx="342206" cy="1084714"/>
-          </a:xfrm>
-          <a:prstGeom prst="rect">
-            <a:avLst/>
-          </a:prstGeom>
-          <a:solidFill>
-            <a:srgbClr val="A6CEE3"/>
-          </a:solidFill>
-          <a:ln w="12700">
-            <a:solidFill>
-              <a:schemeClr val="tx1"/>
-            </a:solidFill>
-          </a:ln>
-        </p:spPr>
-        <p:style>
-          <a:lnRef idx="2">
-            <a:schemeClr val="accent1">
-              <a:shade val="50000"/>
-            </a:schemeClr>
-          </a:lnRef>
-          <a:fillRef idx="1">
-            <a:schemeClr val="accent1"/>
-          </a:fillRef>
-          <a:effectRef idx="0">
-            <a:schemeClr val="accent1"/>
-          </a:effectRef>
-          <a:fontRef idx="minor">
-            <a:schemeClr val="lt1"/>
-          </a:fontRef>
-        </p:style>
-        <p:txBody>
-          <a:bodyPr vert="vert270" rtlCol="0" anchor="ctr"/>
-          <a:lstStyle/>
-          <a:p>
-            <a:pPr algn="ctr"/>
-            <a:r>
-              <a:rPr lang="en-US" sz="800" dirty="0" smtClean="0">
-                <a:solidFill>
-                  <a:sysClr val="windowText" lastClr="000000"/>
-                </a:solidFill>
-                <a:latin typeface="Arial" pitchFamily="34" charset="0"/>
-                <a:cs typeface="Arial" pitchFamily="34" charset="0"/>
-              </a:rPr>
-              <a:t>Monitoring Core</a:t>
-            </a:r>
-            <a:endParaRPr lang="en-US" sz="800" dirty="0">
-              <a:solidFill>
-                <a:sysClr val="windowText" lastClr="000000"/>
-              </a:solidFill>
-              <a:latin typeface="Arial" pitchFamily="34" charset="0"/>
-              <a:cs typeface="Arial" pitchFamily="34" charset="0"/>
-            </a:endParaRPr>
-          </a:p>
-        </p:txBody>
-      </p:sp>
-      <p:cxnSp>
-        <p:nvCxnSpPr>
-          <p:cNvPr id="27" name="Straight Arrow Connector 26"/>
-          <p:cNvCxnSpPr/>
-          <p:nvPr/>
-        </p:nvCxnSpPr>
-        <p:spPr>
-          <a:xfrm>
-            <a:off x="399519" y="677108"/>
-            <a:ext cx="698500" cy="0"/>
-          </a:xfrm>
-          <a:prstGeom prst="straightConnector1">
-            <a:avLst/>
-          </a:prstGeom>
-          <a:ln w="12700">
-            <a:solidFill>
-              <a:schemeClr val="tx1"/>
-            </a:solidFill>
-            <a:tailEnd type="triangle"/>
-          </a:ln>
-        </p:spPr>
-        <p:style>
-          <a:lnRef idx="1">
-            <a:schemeClr val="accent1"/>
-          </a:lnRef>
-          <a:fillRef idx="0">
-            <a:schemeClr val="accent1"/>
-          </a:fillRef>
-          <a:effectRef idx="0">
-            <a:schemeClr val="accent1"/>
-          </a:effectRef>
-          <a:fontRef idx="minor">
-            <a:schemeClr val="tx1"/>
-          </a:fontRef>
-        </p:style>
-      </p:cxnSp>
-      <p:cxnSp>
-        <p:nvCxnSpPr>
-          <p:cNvPr id="29" name="Straight Arrow Connector 28"/>
-          <p:cNvCxnSpPr/>
-          <p:nvPr/>
-        </p:nvCxnSpPr>
-        <p:spPr>
-          <a:xfrm>
-            <a:off x="399519" y="338554"/>
-            <a:ext cx="698500" cy="0"/>
+            <a:off x="3866477" y="620928"/>
+            <a:ext cx="1" cy="233088"/>
           </a:xfrm>
           <a:prstGeom prst="straightConnector1">
             <a:avLst/>
@@ -10738,147 +10919,6 @@
           </a:fontRef>
         </p:style>
       </p:cxnSp>
-      <p:sp>
-        <p:nvSpPr>
-          <p:cNvPr id="11" name="Rectangle 10"/>
-          <p:cNvSpPr/>
-          <p:nvPr/>
-        </p:nvSpPr>
-        <p:spPr>
-          <a:xfrm>
-            <a:off x="4233381" y="76916"/>
-            <a:ext cx="886563" cy="1282809"/>
-          </a:xfrm>
-          <a:prstGeom prst="rect">
-            <a:avLst/>
-          </a:prstGeom>
-          <a:solidFill>
-            <a:srgbClr val="A6CEE3"/>
-          </a:solidFill>
-          <a:ln w="12700">
-            <a:solidFill>
-              <a:schemeClr val="tx1"/>
-            </a:solidFill>
-          </a:ln>
-        </p:spPr>
-        <p:style>
-          <a:lnRef idx="2">
-            <a:schemeClr val="accent1">
-              <a:shade val="50000"/>
-            </a:schemeClr>
-          </a:lnRef>
-          <a:fillRef idx="1">
-            <a:schemeClr val="accent1"/>
-          </a:fillRef>
-          <a:effectRef idx="0">
-            <a:schemeClr val="accent1"/>
-          </a:effectRef>
-          <a:fontRef idx="minor">
-            <a:schemeClr val="lt1"/>
-          </a:fontRef>
-        </p:style>
-        <p:txBody>
-          <a:bodyPr rtlCol="0" anchor="ctr"/>
-          <a:lstStyle/>
-          <a:p>
-            <a:pPr algn="ctr"/>
-            <a:r>
-              <a:rPr lang="en-US" sz="800" dirty="0" smtClean="0">
-                <a:solidFill>
-                  <a:sysClr val="windowText" lastClr="000000"/>
-                </a:solidFill>
-                <a:latin typeface="Arial" pitchFamily="34" charset="0"/>
-                <a:cs typeface="Arial" pitchFamily="34" charset="0"/>
-              </a:rPr>
-              <a:t>Monitoring Core</a:t>
-            </a:r>
-            <a:endParaRPr lang="en-US" sz="800" dirty="0">
-              <a:solidFill>
-                <a:sysClr val="windowText" lastClr="000000"/>
-              </a:solidFill>
-              <a:latin typeface="Arial" pitchFamily="34" charset="0"/>
-              <a:cs typeface="Arial" pitchFamily="34" charset="0"/>
-            </a:endParaRPr>
-          </a:p>
-        </p:txBody>
-      </p:sp>
-      <p:sp>
-        <p:nvSpPr>
-          <p:cNvPr id="12" name="Rectangle 11"/>
-          <p:cNvSpPr/>
-          <p:nvPr/>
-        </p:nvSpPr>
-        <p:spPr>
-          <a:xfrm>
-            <a:off x="213519" y="76917"/>
-            <a:ext cx="886563" cy="1282810"/>
-          </a:xfrm>
-          <a:prstGeom prst="rect">
-            <a:avLst/>
-          </a:prstGeom>
-          <a:solidFill>
-            <a:srgbClr val="A6CEE3"/>
-          </a:solidFill>
-          <a:ln w="12700">
-            <a:solidFill>
-              <a:schemeClr val="tx1"/>
-            </a:solidFill>
-          </a:ln>
-        </p:spPr>
-        <p:style>
-          <a:lnRef idx="2">
-            <a:schemeClr val="accent1">
-              <a:shade val="50000"/>
-            </a:schemeClr>
-          </a:lnRef>
-          <a:fillRef idx="1">
-            <a:schemeClr val="accent1"/>
-          </a:fillRef>
-          <a:effectRef idx="0">
-            <a:schemeClr val="accent1"/>
-          </a:effectRef>
-          <a:fontRef idx="minor">
-            <a:schemeClr val="lt1"/>
-          </a:fontRef>
-        </p:style>
-        <p:txBody>
-          <a:bodyPr rtlCol="0" anchor="ctr"/>
-          <a:lstStyle/>
-          <a:p>
-            <a:pPr algn="ctr"/>
-            <a:r>
-              <a:rPr lang="en-US" sz="800" dirty="0" smtClean="0">
-                <a:solidFill>
-                  <a:sysClr val="windowText" lastClr="000000"/>
-                </a:solidFill>
-                <a:latin typeface="Arial" pitchFamily="34" charset="0"/>
-                <a:cs typeface="Arial" pitchFamily="34" charset="0"/>
-              </a:rPr>
-              <a:t>Main</a:t>
-            </a:r>
-          </a:p>
-          <a:p>
-            <a:pPr algn="ctr"/>
-            <a:r>
-              <a:rPr lang="en-US" sz="800" dirty="0" smtClean="0">
-                <a:solidFill>
-                  <a:sysClr val="windowText" lastClr="000000"/>
-                </a:solidFill>
-                <a:latin typeface="Arial" pitchFamily="34" charset="0"/>
-                <a:cs typeface="Arial" pitchFamily="34" charset="0"/>
-              </a:rPr>
-              <a:t>Core</a:t>
-            </a:r>
-            <a:endParaRPr lang="en-US" sz="800" dirty="0">
-              <a:solidFill>
-                <a:sysClr val="windowText" lastClr="000000"/>
-              </a:solidFill>
-              <a:latin typeface="Arial" pitchFamily="34" charset="0"/>
-              <a:cs typeface="Arial" pitchFamily="34" charset="0"/>
-            </a:endParaRPr>
-          </a:p>
-        </p:txBody>
-      </p:sp>
       <p:cxnSp>
         <p:nvCxnSpPr>
           <p:cNvPr id="13" name="Straight Arrow Connector 12"/>
@@ -11231,8 +11271,8 @@
         </p:nvCxnSpPr>
         <p:spPr>
           <a:xfrm flipH="1">
-            <a:off x="2711228" y="288143"/>
-            <a:ext cx="173917" cy="0"/>
+            <a:off x="2718051" y="288143"/>
+            <a:ext cx="167095" cy="0"/>
           </a:xfrm>
           <a:prstGeom prst="line">
             <a:avLst/>
@@ -11258,6 +11298,147 @@
           </a:fontRef>
         </p:style>
       </p:cxnSp>
+      <p:sp>
+        <p:nvSpPr>
+          <p:cNvPr id="23" name="Rectangle 22"/>
+          <p:cNvSpPr/>
+          <p:nvPr/>
+        </p:nvSpPr>
+        <p:spPr>
+          <a:xfrm>
+            <a:off x="428282" y="76916"/>
+            <a:ext cx="676177" cy="1282811"/>
+          </a:xfrm>
+          <a:prstGeom prst="rect">
+            <a:avLst/>
+          </a:prstGeom>
+          <a:solidFill>
+            <a:srgbClr val="A6CEE3"/>
+          </a:solidFill>
+          <a:ln w="12700">
+            <a:solidFill>
+              <a:schemeClr val="tx1"/>
+            </a:solidFill>
+          </a:ln>
+        </p:spPr>
+        <p:style>
+          <a:lnRef idx="2">
+            <a:schemeClr val="accent1">
+              <a:shade val="50000"/>
+            </a:schemeClr>
+          </a:lnRef>
+          <a:fillRef idx="1">
+            <a:schemeClr val="accent1"/>
+          </a:fillRef>
+          <a:effectRef idx="0">
+            <a:schemeClr val="accent1"/>
+          </a:effectRef>
+          <a:fontRef idx="minor">
+            <a:schemeClr val="lt1"/>
+          </a:fontRef>
+        </p:style>
+        <p:txBody>
+          <a:bodyPr rtlCol="0" anchor="ctr"/>
+          <a:lstStyle/>
+          <a:p>
+            <a:pPr algn="ctr"/>
+            <a:r>
+              <a:rPr lang="en-US" sz="800" dirty="0" smtClean="0">
+                <a:solidFill>
+                  <a:sysClr val="windowText" lastClr="000000"/>
+                </a:solidFill>
+                <a:latin typeface="Arial" pitchFamily="34" charset="0"/>
+                <a:cs typeface="Arial" pitchFamily="34" charset="0"/>
+              </a:rPr>
+              <a:t>Main</a:t>
+            </a:r>
+          </a:p>
+          <a:p>
+            <a:pPr algn="ctr"/>
+            <a:r>
+              <a:rPr lang="en-US" sz="800" dirty="0" smtClean="0">
+                <a:solidFill>
+                  <a:sysClr val="windowText" lastClr="000000"/>
+                </a:solidFill>
+                <a:latin typeface="Arial" pitchFamily="34" charset="0"/>
+                <a:cs typeface="Arial" pitchFamily="34" charset="0"/>
+              </a:rPr>
+              <a:t>Core</a:t>
+            </a:r>
+            <a:endParaRPr lang="en-US" sz="800" dirty="0">
+              <a:solidFill>
+                <a:sysClr val="windowText" lastClr="000000"/>
+              </a:solidFill>
+              <a:latin typeface="Arial" pitchFamily="34" charset="0"/>
+              <a:cs typeface="Arial" pitchFamily="34" charset="0"/>
+            </a:endParaRPr>
+          </a:p>
+        </p:txBody>
+      </p:sp>
+      <p:sp>
+        <p:nvSpPr>
+          <p:cNvPr id="24" name="Rectangle 23"/>
+          <p:cNvSpPr/>
+          <p:nvPr/>
+        </p:nvSpPr>
+        <p:spPr>
+          <a:xfrm>
+            <a:off x="4237751" y="76916"/>
+            <a:ext cx="676177" cy="1282811"/>
+          </a:xfrm>
+          <a:prstGeom prst="rect">
+            <a:avLst/>
+          </a:prstGeom>
+          <a:solidFill>
+            <a:srgbClr val="A6CEE3"/>
+          </a:solidFill>
+          <a:ln w="12700">
+            <a:solidFill>
+              <a:schemeClr val="tx1"/>
+            </a:solidFill>
+          </a:ln>
+        </p:spPr>
+        <p:style>
+          <a:lnRef idx="2">
+            <a:schemeClr val="accent1">
+              <a:shade val="50000"/>
+            </a:schemeClr>
+          </a:lnRef>
+          <a:fillRef idx="1">
+            <a:schemeClr val="accent1"/>
+          </a:fillRef>
+          <a:effectRef idx="0">
+            <a:schemeClr val="accent1"/>
+          </a:effectRef>
+          <a:fontRef idx="minor">
+            <a:schemeClr val="lt1"/>
+          </a:fontRef>
+        </p:style>
+        <p:txBody>
+          <a:bodyPr rtlCol="0" anchor="ctr"/>
+          <a:lstStyle/>
+          <a:p>
+            <a:pPr algn="ctr"/>
+            <a:r>
+              <a:rPr lang="en-US" sz="800" dirty="0" smtClean="0">
+                <a:solidFill>
+                  <a:sysClr val="windowText" lastClr="000000"/>
+                </a:solidFill>
+                <a:latin typeface="Arial" pitchFamily="34" charset="0"/>
+                <a:cs typeface="Arial" pitchFamily="34" charset="0"/>
+              </a:rPr>
+              <a:t>Monitoring Core</a:t>
+            </a:r>
+            <a:endParaRPr lang="en-US" sz="800" dirty="0">
+              <a:solidFill>
+                <a:sysClr val="windowText" lastClr="000000"/>
+              </a:solidFill>
+              <a:latin typeface="Arial" pitchFamily="34" charset="0"/>
+              <a:cs typeface="Arial" pitchFamily="34" charset="0"/>
+            </a:endParaRPr>
+          </a:p>
+        </p:txBody>
+      </p:sp>
     </p:spTree>
     <p:extLst>
       <p:ext uri="{BB962C8B-B14F-4D97-AF65-F5344CB8AC3E}">

</xml_diff>